<commit_message>
Added changes to PowerPoint. Need to finish adding the results and the block diagram.
</commit_message>
<xml_diff>
--- a/results/CSE509_Video_Steganography.pptx
+++ b/results/CSE509_Video_Steganography.pptx
@@ -5,7 +5,7 @@
     <p:sldMasterId id="2147483792" r:id="rId1"/>
   </p:sldMasterIdLst>
   <p:notesMasterIdLst>
-    <p:notesMasterId r:id="rId16"/>
+    <p:notesMasterId r:id="rId19"/>
   </p:notesMasterIdLst>
   <p:sldIdLst>
     <p:sldId id="256" r:id="rId2"/>
@@ -19,9 +19,12 @@
     <p:sldId id="275" r:id="rId10"/>
     <p:sldId id="276" r:id="rId11"/>
     <p:sldId id="277" r:id="rId12"/>
-    <p:sldId id="267" r:id="rId13"/>
-    <p:sldId id="268" r:id="rId14"/>
-    <p:sldId id="269" r:id="rId15"/>
+    <p:sldId id="278" r:id="rId13"/>
+    <p:sldId id="279" r:id="rId14"/>
+    <p:sldId id="280" r:id="rId15"/>
+    <p:sldId id="267" r:id="rId16"/>
+    <p:sldId id="268" r:id="rId17"/>
+    <p:sldId id="269" r:id="rId18"/>
   </p:sldIdLst>
   <p:sldSz cx="9144000" cy="6858000" type="screen4x3"/>
   <p:notesSz cx="6858000" cy="9144000"/>
@@ -15094,7 +15097,7 @@
             </a:r>
             <a:r>
               <a:rPr lang="en-US" dirty="0" smtClean="0"/>
-              <a:t>2: Algorithm </a:t>
+              <a:t>2: Embedding</a:t>
             </a:r>
             <a:endParaRPr lang="en-US" dirty="0"/>
           </a:p>
@@ -15117,8 +15120,52 @@
           <a:p>
             <a:r>
               <a:rPr lang="en-US" dirty="0" smtClean="0"/>
-              <a:t>Apply 2D DCT to entire host frame.</a:t>
+              <a:t>Apply 2D DCT to entire Y channel of the host frame.</a:t>
             </a:r>
+          </a:p>
+          <a:p>
+            <a:pPr lvl="1"/>
+            <a:r>
+              <a:rPr lang="en-US" dirty="0" smtClean="0"/>
+              <a:t>This breaks the frame into frequency components.</a:t>
+            </a:r>
+          </a:p>
+          <a:p>
+            <a:r>
+              <a:rPr lang="en-US" dirty="0" smtClean="0"/>
+              <a:t>Specify the number of LSB/MSB bits to use for embedding.</a:t>
+            </a:r>
+          </a:p>
+          <a:p>
+            <a:r>
+              <a:rPr lang="en-US" dirty="0" smtClean="0"/>
+              <a:t>Create random bit mask for later use, or custom bit mask can be specified. </a:t>
+            </a:r>
+          </a:p>
+          <a:p>
+            <a:pPr lvl="1"/>
+            <a:r>
+              <a:rPr lang="en-US" dirty="0" smtClean="0"/>
+              <a:t>This bit mask will be the same size as a CIF frame.</a:t>
+            </a:r>
+          </a:p>
+          <a:p>
+            <a:r>
+              <a:rPr lang="en-US" dirty="0" smtClean="0"/>
+              <a:t>Iterate through the bit mask, and store an MSB/LSB value in an alternating pattern in the carrier frame if the bit is on.</a:t>
+            </a:r>
+          </a:p>
+          <a:p>
+            <a:r>
+              <a:rPr lang="en-US" dirty="0" smtClean="0"/>
+              <a:t>Apply IDCT and save the YUV channels and results in the embedded carrier.</a:t>
+            </a:r>
+          </a:p>
+          <a:p>
+            <a:endParaRPr lang="en-US" dirty="0" smtClean="0"/>
+          </a:p>
+          <a:p>
+            <a:endParaRPr lang="en-US" dirty="0" smtClean="0"/>
           </a:p>
           <a:p>
             <a:endParaRPr lang="en-US" dirty="0"/>
@@ -15179,6 +15226,303 @@
         </p:nvSpPr>
         <p:spPr/>
         <p:txBody>
+          <a:bodyPr/>
+          <a:lstStyle/>
+          <a:p>
+            <a:r>
+              <a:rPr lang="en-US" dirty="0" smtClean="0"/>
+              <a:t>Approach 2: Bit Mask</a:t>
+            </a:r>
+            <a:endParaRPr lang="en-US" dirty="0"/>
+          </a:p>
+        </p:txBody>
+      </p:sp>
+      <p:pic>
+        <p:nvPicPr>
+          <p:cNvPr id="6" name="Content Placeholder 5"/>
+          <p:cNvPicPr>
+            <a:picLocks noGrp="1" noChangeAspect="1"/>
+          </p:cNvPicPr>
+          <p:nvPr>
+            <p:ph idx="1"/>
+          </p:nvPr>
+        </p:nvPicPr>
+        <p:blipFill rotWithShape="1">
+          <a:blip r:embed="rId2">
+            <a:extLst>
+              <a:ext uri="{28A0092B-C50C-407E-A947-70E740481C1C}">
+                <a14:useLocalDpi xmlns:a14="http://schemas.microsoft.com/office/drawing/2010/main" val="0"/>
+              </a:ext>
+            </a:extLst>
+          </a:blip>
+          <a:srcRect l="19356" t="9579" r="19358" b="16390"/>
+          <a:stretch/>
+        </p:blipFill>
+        <p:spPr>
+          <a:xfrm>
+            <a:off x="2209800" y="1219200"/>
+            <a:ext cx="4648199" cy="4571999"/>
+          </a:xfrm>
+        </p:spPr>
+      </p:pic>
+    </p:spTree>
+    <p:extLst>
+      <p:ext uri="{BB962C8B-B14F-4D97-AF65-F5344CB8AC3E}">
+        <p14:creationId xmlns:p14="http://schemas.microsoft.com/office/powerpoint/2010/main" val="537851492"/>
+      </p:ext>
+    </p:extLst>
+  </p:cSld>
+  <p:clrMapOvr>
+    <a:masterClrMapping/>
+  </p:clrMapOvr>
+  <mc:AlternateContent xmlns:mc="http://schemas.openxmlformats.org/markup-compatibility/2006" xmlns:p14="http://schemas.microsoft.com/office/powerpoint/2010/main">
+    <mc:Choice Requires="p14">
+      <p:transition spd="slow" p14:dur="800">
+        <p14:flythrough/>
+      </p:transition>
+    </mc:Choice>
+    <mc:Fallback xmlns="">
+      <p:transition spd="slow">
+        <p:fade/>
+      </p:transition>
+    </mc:Fallback>
+  </mc:AlternateContent>
+</p:sld>
+</file>
+
+<file path=ppt/slides/slide13.xml><?xml version="1.0" encoding="utf-8"?>
+<p:sld xmlns:a="http://schemas.openxmlformats.org/drawingml/2006/main" xmlns:r="http://schemas.openxmlformats.org/officeDocument/2006/relationships" xmlns:p="http://schemas.openxmlformats.org/presentationml/2006/main">
+  <p:cSld>
+    <p:spTree>
+      <p:nvGrpSpPr>
+        <p:cNvPr id="1" name=""/>
+        <p:cNvGrpSpPr/>
+        <p:nvPr/>
+      </p:nvGrpSpPr>
+      <p:grpSpPr>
+        <a:xfrm>
+          <a:off x="0" y="0"/>
+          <a:ext cx="0" cy="0"/>
+          <a:chOff x="0" y="0"/>
+          <a:chExt cx="0" cy="0"/>
+        </a:xfrm>
+      </p:grpSpPr>
+      <p:sp>
+        <p:nvSpPr>
+          <p:cNvPr id="2" name="Title 1"/>
+          <p:cNvSpPr>
+            <a:spLocks noGrp="1"/>
+          </p:cNvSpPr>
+          <p:nvPr>
+            <p:ph type="title"/>
+          </p:nvPr>
+        </p:nvSpPr>
+        <p:spPr/>
+        <p:txBody>
+          <a:bodyPr/>
+          <a:lstStyle/>
+          <a:p>
+            <a:r>
+              <a:rPr lang="en-US" dirty="0" smtClean="0"/>
+              <a:t>Approach 2: Selection </a:t>
+            </a:r>
+            <a:endParaRPr lang="en-US" dirty="0"/>
+          </a:p>
+        </p:txBody>
+      </p:sp>
+      <p:pic>
+        <p:nvPicPr>
+          <p:cNvPr id="4" name="Content Placeholder 3"/>
+          <p:cNvPicPr>
+            <a:picLocks noGrp="1" noChangeAspect="1"/>
+          </p:cNvPicPr>
+          <p:nvPr>
+            <p:ph idx="1"/>
+          </p:nvPr>
+        </p:nvPicPr>
+        <p:blipFill>
+          <a:blip r:embed="rId2">
+            <a:extLst>
+              <a:ext uri="{28A0092B-C50C-407E-A947-70E740481C1C}">
+                <a14:useLocalDpi xmlns:a14="http://schemas.microsoft.com/office/drawing/2010/main" val="0"/>
+              </a:ext>
+            </a:extLst>
+          </a:blip>
+          <a:stretch>
+            <a:fillRect/>
+          </a:stretch>
+        </p:blipFill>
+        <p:spPr>
+          <a:xfrm>
+            <a:off x="685800" y="2435104"/>
+            <a:ext cx="7772400" cy="2063991"/>
+          </a:xfrm>
+        </p:spPr>
+      </p:pic>
+    </p:spTree>
+    <p:extLst>
+      <p:ext uri="{BB962C8B-B14F-4D97-AF65-F5344CB8AC3E}">
+        <p14:creationId xmlns:p14="http://schemas.microsoft.com/office/powerpoint/2010/main" val="2466668417"/>
+      </p:ext>
+    </p:extLst>
+  </p:cSld>
+  <p:clrMapOvr>
+    <a:masterClrMapping/>
+  </p:clrMapOvr>
+  <mc:AlternateContent xmlns:mc="http://schemas.openxmlformats.org/markup-compatibility/2006" xmlns:p14="http://schemas.microsoft.com/office/powerpoint/2010/main">
+    <mc:Choice Requires="p14">
+      <p:transition spd="slow" p14:dur="800">
+        <p14:flythrough/>
+      </p:transition>
+    </mc:Choice>
+    <mc:Fallback xmlns="">
+      <p:transition spd="slow">
+        <p:fade/>
+      </p:transition>
+    </mc:Fallback>
+  </mc:AlternateContent>
+</p:sld>
+</file>
+
+<file path=ppt/slides/slide14.xml><?xml version="1.0" encoding="utf-8"?>
+<p:sld xmlns:a="http://schemas.openxmlformats.org/drawingml/2006/main" xmlns:r="http://schemas.openxmlformats.org/officeDocument/2006/relationships" xmlns:p="http://schemas.openxmlformats.org/presentationml/2006/main">
+  <p:cSld>
+    <p:spTree>
+      <p:nvGrpSpPr>
+        <p:cNvPr id="1" name=""/>
+        <p:cNvGrpSpPr/>
+        <p:nvPr/>
+      </p:nvGrpSpPr>
+      <p:grpSpPr>
+        <a:xfrm>
+          <a:off x="0" y="0"/>
+          <a:ext cx="0" cy="0"/>
+          <a:chOff x="0" y="0"/>
+          <a:chExt cx="0" cy="0"/>
+        </a:xfrm>
+      </p:grpSpPr>
+      <p:sp>
+        <p:nvSpPr>
+          <p:cNvPr id="2" name="Title 1"/>
+          <p:cNvSpPr>
+            <a:spLocks noGrp="1"/>
+          </p:cNvSpPr>
+          <p:nvPr>
+            <p:ph type="title"/>
+          </p:nvPr>
+        </p:nvSpPr>
+        <p:spPr/>
+        <p:txBody>
+          <a:bodyPr/>
+          <a:lstStyle/>
+          <a:p>
+            <a:r>
+              <a:rPr lang="en-US" dirty="0" smtClean="0"/>
+              <a:t>Approach 2: Retrieval</a:t>
+            </a:r>
+            <a:endParaRPr lang="en-US" dirty="0"/>
+          </a:p>
+        </p:txBody>
+      </p:sp>
+      <p:sp>
+        <p:nvSpPr>
+          <p:cNvPr id="3" name="Content Placeholder 2"/>
+          <p:cNvSpPr>
+            <a:spLocks noGrp="1"/>
+          </p:cNvSpPr>
+          <p:nvPr>
+            <p:ph idx="1"/>
+          </p:nvPr>
+        </p:nvSpPr>
+        <p:spPr/>
+        <p:txBody>
+          <a:bodyPr/>
+          <a:lstStyle/>
+          <a:p>
+            <a:r>
+              <a:rPr lang="en-US" dirty="0" smtClean="0"/>
+              <a:t>Same initial process as the embedding section.</a:t>
+            </a:r>
+          </a:p>
+          <a:p>
+            <a:r>
+              <a:rPr lang="en-US" dirty="0" smtClean="0"/>
+              <a:t>Iterate through the Y channel of the carrier frame and extract the last n-bits from the current value.</a:t>
+            </a:r>
+          </a:p>
+          <a:p>
+            <a:r>
+              <a:rPr lang="en-US" dirty="0" smtClean="0"/>
+              <a:t>Every pair that is extracted is joined to form an 8-bit pixel, which will be used to form the seed frame.</a:t>
+            </a:r>
+          </a:p>
+          <a:p>
+            <a:r>
+              <a:rPr lang="en-US" dirty="0" smtClean="0"/>
+              <a:t>Once every pixel is reconstructed a frame has been extracted and can </a:t>
+            </a:r>
+            <a:r>
+              <a:rPr lang="en-US" smtClean="0"/>
+              <a:t>be saved.</a:t>
+            </a:r>
+            <a:endParaRPr lang="en-US" dirty="0"/>
+          </a:p>
+        </p:txBody>
+      </p:sp>
+    </p:spTree>
+    <p:extLst>
+      <p:ext uri="{BB962C8B-B14F-4D97-AF65-F5344CB8AC3E}">
+        <p14:creationId xmlns:p14="http://schemas.microsoft.com/office/powerpoint/2010/main" val="2230257474"/>
+      </p:ext>
+    </p:extLst>
+  </p:cSld>
+  <p:clrMapOvr>
+    <a:masterClrMapping/>
+  </p:clrMapOvr>
+  <mc:AlternateContent xmlns:mc="http://schemas.openxmlformats.org/markup-compatibility/2006" xmlns:p14="http://schemas.microsoft.com/office/powerpoint/2010/main">
+    <mc:Choice Requires="p14">
+      <p:transition spd="slow" p14:dur="800">
+        <p14:flythrough/>
+      </p:transition>
+    </mc:Choice>
+    <mc:Fallback xmlns="">
+      <p:transition spd="slow">
+        <p:fade/>
+      </p:transition>
+    </mc:Fallback>
+  </mc:AlternateContent>
+</p:sld>
+</file>
+
+<file path=ppt/slides/slide15.xml><?xml version="1.0" encoding="utf-8"?>
+<p:sld xmlns:a="http://schemas.openxmlformats.org/drawingml/2006/main" xmlns:r="http://schemas.openxmlformats.org/officeDocument/2006/relationships" xmlns:p="http://schemas.openxmlformats.org/presentationml/2006/main">
+  <p:cSld>
+    <p:spTree>
+      <p:nvGrpSpPr>
+        <p:cNvPr id="1" name=""/>
+        <p:cNvGrpSpPr/>
+        <p:nvPr/>
+      </p:nvGrpSpPr>
+      <p:grpSpPr>
+        <a:xfrm>
+          <a:off x="0" y="0"/>
+          <a:ext cx="0" cy="0"/>
+          <a:chOff x="0" y="0"/>
+          <a:chExt cx="0" cy="0"/>
+        </a:xfrm>
+      </p:grpSpPr>
+      <p:sp>
+        <p:nvSpPr>
+          <p:cNvPr id="2" name="Title 1"/>
+          <p:cNvSpPr>
+            <a:spLocks noGrp="1"/>
+          </p:cNvSpPr>
+          <p:nvPr>
+            <p:ph type="title"/>
+          </p:nvPr>
+        </p:nvSpPr>
+        <p:spPr/>
+        <p:txBody>
           <a:bodyPr>
             <a:normAutofit fontScale="90000"/>
           </a:bodyPr>
@@ -15247,7 +15591,7 @@
 </p:sld>
 </file>
 
-<file path=ppt/slides/slide13.xml><?xml version="1.0" encoding="utf-8"?>
+<file path=ppt/slides/slide16.xml><?xml version="1.0" encoding="utf-8"?>
 <p:sld xmlns:a="http://schemas.openxmlformats.org/drawingml/2006/main" xmlns:r="http://schemas.openxmlformats.org/officeDocument/2006/relationships" xmlns:p="http://schemas.openxmlformats.org/presentationml/2006/main">
   <p:cSld>
     <p:spTree>
@@ -15374,7 +15718,7 @@
 </p:sld>
 </file>
 
-<file path=ppt/slides/slide14.xml><?xml version="1.0" encoding="utf-8"?>
+<file path=ppt/slides/slide17.xml><?xml version="1.0" encoding="utf-8"?>
 <p:sld xmlns:a="http://schemas.openxmlformats.org/drawingml/2006/main" xmlns:r="http://schemas.openxmlformats.org/officeDocument/2006/relationships" xmlns:p="http://schemas.openxmlformats.org/presentationml/2006/main">
   <p:cSld>
     <p:spTree>

</xml_diff>